<commit_message>
Deployed 75a2f2f with MkDocs version: 1.1.2
</commit_message>
<xml_diff>
--- a/slides/Connecting-PWM-Cards.pptx
+++ b/slides/Connecting-PWM-Cards.pptx
@@ -3839,8 +3839,8 @@
         </p:nvSpPr>
         <p:spPr>
           <a:xfrm>
-            <a:off x="1426029" y="153534"/>
-            <a:ext cx="9144000" cy="516556"/>
+            <a:off x="4072973" y="64514"/>
+            <a:ext cx="4392253" cy="516556"/>
           </a:xfrm>
         </p:spPr>
         <p:txBody>
@@ -3851,7 +3851,7 @@
           <a:p>
             <a:r>
               <a:rPr lang="en-US" sz="2400" b="1" dirty="0"/>
-              <a:t>Connecting PWM Cards</a:t>
+              <a:t>Connecting PWM PCA 9685 Cards</a:t>
             </a:r>
           </a:p>
         </p:txBody>
@@ -4089,7 +4089,7 @@
         </p:blipFill>
         <p:spPr>
           <a:xfrm>
-            <a:off x="475570" y="153534"/>
+            <a:off x="264514" y="85272"/>
             <a:ext cx="2714913" cy="380610"/>
           </a:xfrm>
           <a:prstGeom prst="rect">
@@ -4221,6 +4221,237 @@
               <a:rPr lang="en-US" dirty="0"/>
               <a:t>Top Left Corner</a:t>
             </a:r>
+          </a:p>
+        </p:txBody>
+      </p:sp>
+      <p:sp>
+        <p:nvSpPr>
+          <p:cNvPr id="15" name="TextBox 14">
+            <a:extLst>
+              <a:ext uri="{FF2B5EF4-FFF2-40B4-BE49-F238E27FC236}">
+                <a16:creationId xmlns:a16="http://schemas.microsoft.com/office/drawing/2014/main" id="{EEDD42C4-EF35-7149-8EDF-CFE14F166A38}"/>
+              </a:ext>
+            </a:extLst>
+          </p:cNvPr>
+          <p:cNvSpPr txBox="1"/>
+          <p:nvPr/>
+        </p:nvSpPr>
+        <p:spPr>
+          <a:xfrm>
+            <a:off x="6021667" y="5450689"/>
+            <a:ext cx="1257974" cy="1169551"/>
+          </a:xfrm>
+          <a:prstGeom prst="rect">
+            <a:avLst/>
+          </a:prstGeom>
+          <a:noFill/>
+        </p:spPr>
+        <p:txBody>
+          <a:bodyPr wrap="square" rtlCol="0">
+            <a:spAutoFit/>
+          </a:bodyPr>
+          <a:lstStyle/>
+          <a:p>
+            <a:r>
+              <a:rPr lang="en-US" sz="1400" dirty="0"/>
+              <a:t>Tip: look for red LED on the PWM card to verify it is connected</a:t>
+            </a:r>
+          </a:p>
+        </p:txBody>
+      </p:sp>
+      <p:sp>
+        <p:nvSpPr>
+          <p:cNvPr id="16" name="Rectangle 15">
+            <a:extLst>
+              <a:ext uri="{FF2B5EF4-FFF2-40B4-BE49-F238E27FC236}">
+                <a16:creationId xmlns:a16="http://schemas.microsoft.com/office/drawing/2014/main" id="{6094B19F-5343-C54A-87DB-D1A5C4198D39}"/>
+              </a:ext>
+            </a:extLst>
+          </p:cNvPr>
+          <p:cNvSpPr/>
+          <p:nvPr/>
+        </p:nvSpPr>
+        <p:spPr>
+          <a:xfrm>
+            <a:off x="4023203" y="1444591"/>
+            <a:ext cx="180807" cy="462268"/>
+          </a:xfrm>
+          <a:prstGeom prst="rect">
+            <a:avLst/>
+          </a:prstGeom>
+          <a:solidFill>
+            <a:srgbClr val="FF0000"/>
+          </a:solidFill>
+        </p:spPr>
+        <p:style>
+          <a:lnRef idx="2">
+            <a:schemeClr val="accent1">
+              <a:shade val="50000"/>
+            </a:schemeClr>
+          </a:lnRef>
+          <a:fillRef idx="1">
+            <a:schemeClr val="accent1"/>
+          </a:fillRef>
+          <a:effectRef idx="0">
+            <a:schemeClr val="accent1"/>
+          </a:effectRef>
+          <a:fontRef idx="minor">
+            <a:schemeClr val="lt1"/>
+          </a:fontRef>
+        </p:style>
+        <p:txBody>
+          <a:bodyPr rtlCol="0" anchor="ctr"/>
+          <a:lstStyle/>
+          <a:p>
+            <a:pPr algn="ctr"/>
+            <a:endParaRPr lang="en-US"/>
+          </a:p>
+        </p:txBody>
+      </p:sp>
+      <p:sp>
+        <p:nvSpPr>
+          <p:cNvPr id="19" name="Rectangle 18">
+            <a:extLst>
+              <a:ext uri="{FF2B5EF4-FFF2-40B4-BE49-F238E27FC236}">
+                <a16:creationId xmlns:a16="http://schemas.microsoft.com/office/drawing/2014/main" id="{344F8B5C-6DC9-5C4B-8838-511D5215D9CC}"/>
+              </a:ext>
+            </a:extLst>
+          </p:cNvPr>
+          <p:cNvSpPr/>
+          <p:nvPr/>
+        </p:nvSpPr>
+        <p:spPr>
+          <a:xfrm>
+            <a:off x="4242994" y="1439533"/>
+            <a:ext cx="180807" cy="462268"/>
+          </a:xfrm>
+          <a:prstGeom prst="rect">
+            <a:avLst/>
+          </a:prstGeom>
+          <a:solidFill>
+            <a:srgbClr val="FFFF00"/>
+          </a:solidFill>
+        </p:spPr>
+        <p:style>
+          <a:lnRef idx="2">
+            <a:schemeClr val="accent1">
+              <a:shade val="50000"/>
+            </a:schemeClr>
+          </a:lnRef>
+          <a:fillRef idx="1">
+            <a:schemeClr val="accent1"/>
+          </a:fillRef>
+          <a:effectRef idx="0">
+            <a:schemeClr val="accent1"/>
+          </a:effectRef>
+          <a:fontRef idx="minor">
+            <a:schemeClr val="lt1"/>
+          </a:fontRef>
+        </p:style>
+        <p:txBody>
+          <a:bodyPr rtlCol="0" anchor="ctr"/>
+          <a:lstStyle/>
+          <a:p>
+            <a:pPr algn="ctr"/>
+            <a:endParaRPr lang="en-US"/>
+          </a:p>
+        </p:txBody>
+      </p:sp>
+      <p:sp>
+        <p:nvSpPr>
+          <p:cNvPr id="20" name="Rectangle 19">
+            <a:extLst>
+              <a:ext uri="{FF2B5EF4-FFF2-40B4-BE49-F238E27FC236}">
+                <a16:creationId xmlns:a16="http://schemas.microsoft.com/office/drawing/2014/main" id="{602F9714-86AC-2B48-9066-7CB4A1D238B0}"/>
+              </a:ext>
+            </a:extLst>
+          </p:cNvPr>
+          <p:cNvSpPr/>
+          <p:nvPr/>
+        </p:nvSpPr>
+        <p:spPr>
+          <a:xfrm>
+            <a:off x="4442780" y="1439533"/>
+            <a:ext cx="180807" cy="462268"/>
+          </a:xfrm>
+          <a:prstGeom prst="rect">
+            <a:avLst/>
+          </a:prstGeom>
+          <a:solidFill>
+            <a:schemeClr val="accent2"/>
+          </a:solidFill>
+        </p:spPr>
+        <p:style>
+          <a:lnRef idx="2">
+            <a:schemeClr val="accent1">
+              <a:shade val="50000"/>
+            </a:schemeClr>
+          </a:lnRef>
+          <a:fillRef idx="1">
+            <a:schemeClr val="accent1"/>
+          </a:fillRef>
+          <a:effectRef idx="0">
+            <a:schemeClr val="accent1"/>
+          </a:effectRef>
+          <a:fontRef idx="minor">
+            <a:schemeClr val="lt1"/>
+          </a:fontRef>
+        </p:style>
+        <p:txBody>
+          <a:bodyPr rtlCol="0" anchor="ctr"/>
+          <a:lstStyle/>
+          <a:p>
+            <a:pPr algn="ctr"/>
+            <a:endParaRPr lang="en-US"/>
+          </a:p>
+        </p:txBody>
+      </p:sp>
+      <p:sp>
+        <p:nvSpPr>
+          <p:cNvPr id="21" name="Rectangle 20">
+            <a:extLst>
+              <a:ext uri="{FF2B5EF4-FFF2-40B4-BE49-F238E27FC236}">
+                <a16:creationId xmlns:a16="http://schemas.microsoft.com/office/drawing/2014/main" id="{0F3EDEE8-336C-8943-A1AE-E4B985501442}"/>
+              </a:ext>
+            </a:extLst>
+          </p:cNvPr>
+          <p:cNvSpPr/>
+          <p:nvPr/>
+        </p:nvSpPr>
+        <p:spPr>
+          <a:xfrm>
+            <a:off x="4861317" y="1445667"/>
+            <a:ext cx="180807" cy="462268"/>
+          </a:xfrm>
+          <a:prstGeom prst="rect">
+            <a:avLst/>
+          </a:prstGeom>
+          <a:solidFill>
+            <a:schemeClr val="tx1"/>
+          </a:solidFill>
+        </p:spPr>
+        <p:style>
+          <a:lnRef idx="2">
+            <a:schemeClr val="accent1">
+              <a:shade val="50000"/>
+            </a:schemeClr>
+          </a:lnRef>
+          <a:fillRef idx="1">
+            <a:schemeClr val="accent1"/>
+          </a:fillRef>
+          <a:effectRef idx="0">
+            <a:schemeClr val="accent1"/>
+          </a:effectRef>
+          <a:fontRef idx="minor">
+            <a:schemeClr val="lt1"/>
+          </a:fontRef>
+        </p:style>
+        <p:txBody>
+          <a:bodyPr rtlCol="0" anchor="ctr"/>
+          <a:lstStyle/>
+          <a:p>
+            <a:pPr algn="ctr"/>
+            <a:endParaRPr lang="en-US"/>
           </a:p>
         </p:txBody>
       </p:sp>

</xml_diff>